<commit_message>
Update landing paper and statistics
</commit_message>
<xml_diff>
--- a/Slides/slides_landing_FQE.pptx
+++ b/Slides/slides_landing_FQE.pptx
@@ -4034,6 +4034,45 @@
               <a:buFontTx/>
               <a:buChar char="-"/>
             </a:pPr>
+            <a:r>
+              <a:rPr lang="en-US" sz="1200" b="0" i="0" kern="1200" dirty="0">
+                <a:solidFill>
+                  <a:schemeClr val="tx1"/>
+                </a:solidFill>
+                <a:effectLst/>
+                <a:latin typeface="+mn-lt"/>
+                <a:ea typeface="+mn-ea"/>
+                <a:cs typeface="+mn-cs"/>
+              </a:rPr>
+              <a:t>How easy a vessel changes between species (or </a:t>
+            </a:r>
+            <a:r>
+              <a:rPr lang="en-US" sz="1200" b="0" i="0" kern="1200">
+                <a:solidFill>
+                  <a:schemeClr val="tx1"/>
+                </a:solidFill>
+                <a:effectLst/>
+                <a:latin typeface="+mn-lt"/>
+                <a:ea typeface="+mn-ea"/>
+                <a:cs typeface="+mn-cs"/>
+              </a:rPr>
+              <a:t>between gears)</a:t>
+            </a:r>
+            <a:endParaRPr lang="en-US" sz="1200" b="0" i="0" kern="1200" dirty="0">
+              <a:solidFill>
+                <a:schemeClr val="tx1"/>
+              </a:solidFill>
+              <a:effectLst/>
+              <a:latin typeface="+mn-lt"/>
+              <a:ea typeface="+mn-ea"/>
+              <a:cs typeface="+mn-cs"/>
+            </a:endParaRPr>
+          </a:p>
+          <a:p>
+            <a:pPr marL="171450" indent="-171450">
+              <a:buFontTx/>
+              <a:buChar char="-"/>
+            </a:pPr>
             <a:endParaRPr lang="en-US" sz="1200" b="0" i="0" kern="1200" dirty="0">
               <a:solidFill>
                 <a:schemeClr val="tx1"/>
@@ -21229,7 +21268,7 @@
           </a:ln>
           <a:extLst>
             <a:ext uri="{C572A759-6A51-4108-AA02-DFA0A04FC94B}">
-              <ma14:wrappingTextBoxFlag xmlns:lc="http://schemas.openxmlformats.org/drawingml/2006/lockedCanvas" xmlns:ma14="http://schemas.microsoft.com/office/mac/drawingml/2011/main" xmlns:a14="http://schemas.microsoft.com/office/drawing/2010/main" xmlns:m="http://schemas.openxmlformats.org/officeDocument/2006/math" xmlns="" val="1"/>
+              <ma14:wrappingTextBoxFlag xmlns="" xmlns:m="http://schemas.openxmlformats.org/officeDocument/2006/math" xmlns:a14="http://schemas.microsoft.com/office/drawing/2010/main" xmlns:ma14="http://schemas.microsoft.com/office/mac/drawingml/2011/main" xmlns:lc="http://schemas.openxmlformats.org/drawingml/2006/lockedCanvas" val="1"/>
             </a:ext>
           </a:extLst>
         </p:spPr>

</xml_diff>